<commit_message>
Samples implemented using MSGraphClient
</commit_message>
<xml_diff>
--- a/Presentation/MicrosoftGraphAndSPFx.pptx
+++ b/Presentation/MicrosoftGraphAndSPFx.pptx
@@ -5,7 +5,7 @@
     <p:sldMasterId id="2147483648" r:id="rId1"/>
   </p:sldMasterIdLst>
   <p:notesMasterIdLst>
-    <p:notesMasterId r:id="rId18"/>
+    <p:notesMasterId r:id="rId21"/>
   </p:notesMasterIdLst>
   <p:sldIdLst>
     <p:sldId id="258" r:id="rId2"/>
@@ -15,15 +15,18 @@
     <p:sldId id="264" r:id="rId6"/>
     <p:sldId id="257" r:id="rId7"/>
     <p:sldId id="265" r:id="rId8"/>
-    <p:sldId id="269" r:id="rId9"/>
-    <p:sldId id="261" r:id="rId10"/>
-    <p:sldId id="266" r:id="rId11"/>
-    <p:sldId id="268" r:id="rId12"/>
-    <p:sldId id="267" r:id="rId13"/>
-    <p:sldId id="270" r:id="rId14"/>
-    <p:sldId id="272" r:id="rId15"/>
-    <p:sldId id="271" r:id="rId16"/>
-    <p:sldId id="273" r:id="rId17"/>
+    <p:sldId id="261" r:id="rId9"/>
+    <p:sldId id="269" r:id="rId10"/>
+    <p:sldId id="274" r:id="rId11"/>
+    <p:sldId id="266" r:id="rId12"/>
+    <p:sldId id="268" r:id="rId13"/>
+    <p:sldId id="267" r:id="rId14"/>
+    <p:sldId id="276" r:id="rId15"/>
+    <p:sldId id="270" r:id="rId16"/>
+    <p:sldId id="275" r:id="rId17"/>
+    <p:sldId id="272" r:id="rId18"/>
+    <p:sldId id="271" r:id="rId19"/>
+    <p:sldId id="273" r:id="rId20"/>
   </p:sldIdLst>
   <p:sldSz cx="12192000" cy="6858000"/>
   <p:notesSz cx="6858000" cy="9144000"/>
@@ -122,6 +125,11 @@
       </a:defRPr>
     </a:lvl9pPr>
   </p:defaultTextStyle>
+  <p:extLst>
+    <p:ext uri="{EFAFB233-063F-42B5-8137-9DF3F51BA10A}">
+      <p15:sldGuideLst xmlns:p15="http://schemas.microsoft.com/office/powerpoint/2012/main"/>
+    </p:ext>
+  </p:extLst>
 </p:presentation>
 </file>
 
@@ -207,7 +215,7 @@
           <a:p>
             <a:fld id="{159EC8DA-FE58-4C28-B37A-0A7E72735F37}" type="datetimeFigureOut">
               <a:rPr lang="en-US" smtClean="0"/>
-              <a:t>2/10/2020</a:t>
+              <a:t>2/11/2020</a:t>
             </a:fld>
             <a:endParaRPr lang="en-US"/>
           </a:p>
@@ -986,7 +994,7 @@
           <a:p>
             <a:fld id="{C8CE6B7A-16BB-49CA-8F86-7C1E428B07F2}" type="slidenum">
               <a:rPr lang="en-US" smtClean="0"/>
-              <a:t>9</a:t>
+              <a:t>8</a:t>
             </a:fld>
             <a:endParaRPr lang="en-US"/>
           </a:p>
@@ -1073,7 +1081,7 @@
           <a:p>
             <a:fld id="{C8CE6B7A-16BB-49CA-8F86-7C1E428B07F2}" type="slidenum">
               <a:rPr lang="en-US" smtClean="0"/>
-              <a:t>10</a:t>
+              <a:t>11</a:t>
             </a:fld>
             <a:endParaRPr lang="en-US"/>
           </a:p>
@@ -1157,7 +1165,7 @@
           <a:p>
             <a:fld id="{C8CE6B7A-16BB-49CA-8F86-7C1E428B07F2}" type="slidenum">
               <a:rPr lang="en-US" smtClean="0"/>
-              <a:t>11</a:t>
+              <a:t>12</a:t>
             </a:fld>
             <a:endParaRPr lang="en-US"/>
           </a:p>
@@ -1244,7 +1252,7 @@
           <a:p>
             <a:fld id="{C8CE6B7A-16BB-49CA-8F86-7C1E428B07F2}" type="slidenum">
               <a:rPr lang="en-US" smtClean="0"/>
-              <a:t>12</a:t>
+              <a:t>13</a:t>
             </a:fld>
             <a:endParaRPr lang="en-US"/>
           </a:p>
@@ -1410,7 +1418,7 @@
           <a:p>
             <a:fld id="{F0B8144F-018C-4369-A3F6-8A57DCD46019}" type="datetimeFigureOut">
               <a:rPr lang="en-US" smtClean="0"/>
-              <a:t>2/10/2020</a:t>
+              <a:t>2/11/2020</a:t>
             </a:fld>
             <a:endParaRPr lang="en-US"/>
           </a:p>
@@ -1608,7 +1616,7 @@
           <a:p>
             <a:fld id="{F0B8144F-018C-4369-A3F6-8A57DCD46019}" type="datetimeFigureOut">
               <a:rPr lang="en-US" smtClean="0"/>
-              <a:t>2/10/2020</a:t>
+              <a:t>2/11/2020</a:t>
             </a:fld>
             <a:endParaRPr lang="en-US"/>
           </a:p>
@@ -1816,7 +1824,7 @@
           <a:p>
             <a:fld id="{F0B8144F-018C-4369-A3F6-8A57DCD46019}" type="datetimeFigureOut">
               <a:rPr lang="en-US" smtClean="0"/>
-              <a:t>2/10/2020</a:t>
+              <a:t>2/11/2020</a:t>
             </a:fld>
             <a:endParaRPr lang="en-US"/>
           </a:p>
@@ -2014,7 +2022,7 @@
           <a:p>
             <a:fld id="{F0B8144F-018C-4369-A3F6-8A57DCD46019}" type="datetimeFigureOut">
               <a:rPr lang="en-US" smtClean="0"/>
-              <a:t>2/10/2020</a:t>
+              <a:t>2/11/2020</a:t>
             </a:fld>
             <a:endParaRPr lang="en-US"/>
           </a:p>
@@ -2289,7 +2297,7 @@
           <a:p>
             <a:fld id="{F0B8144F-018C-4369-A3F6-8A57DCD46019}" type="datetimeFigureOut">
               <a:rPr lang="en-US" smtClean="0"/>
-              <a:t>2/10/2020</a:t>
+              <a:t>2/11/2020</a:t>
             </a:fld>
             <a:endParaRPr lang="en-US"/>
           </a:p>
@@ -2554,7 +2562,7 @@
           <a:p>
             <a:fld id="{F0B8144F-018C-4369-A3F6-8A57DCD46019}" type="datetimeFigureOut">
               <a:rPr lang="en-US" smtClean="0"/>
-              <a:t>2/10/2020</a:t>
+              <a:t>2/11/2020</a:t>
             </a:fld>
             <a:endParaRPr lang="en-US"/>
           </a:p>
@@ -2966,7 +2974,7 @@
           <a:p>
             <a:fld id="{F0B8144F-018C-4369-A3F6-8A57DCD46019}" type="datetimeFigureOut">
               <a:rPr lang="en-US" smtClean="0"/>
-              <a:t>2/10/2020</a:t>
+              <a:t>2/11/2020</a:t>
             </a:fld>
             <a:endParaRPr lang="en-US"/>
           </a:p>
@@ -3107,7 +3115,7 @@
           <a:p>
             <a:fld id="{F0B8144F-018C-4369-A3F6-8A57DCD46019}" type="datetimeFigureOut">
               <a:rPr lang="en-US" smtClean="0"/>
-              <a:t>2/10/2020</a:t>
+              <a:t>2/11/2020</a:t>
             </a:fld>
             <a:endParaRPr lang="en-US"/>
           </a:p>
@@ -3220,7 +3228,7 @@
           <a:p>
             <a:fld id="{F0B8144F-018C-4369-A3F6-8A57DCD46019}" type="datetimeFigureOut">
               <a:rPr lang="en-US" smtClean="0"/>
-              <a:t>2/10/2020</a:t>
+              <a:t>2/11/2020</a:t>
             </a:fld>
             <a:endParaRPr lang="en-US"/>
           </a:p>
@@ -3531,7 +3539,7 @@
           <a:p>
             <a:fld id="{F0B8144F-018C-4369-A3F6-8A57DCD46019}" type="datetimeFigureOut">
               <a:rPr lang="en-US" smtClean="0"/>
-              <a:t>2/10/2020</a:t>
+              <a:t>2/11/2020</a:t>
             </a:fld>
             <a:endParaRPr lang="en-US"/>
           </a:p>
@@ -3819,7 +3827,7 @@
           <a:p>
             <a:fld id="{F0B8144F-018C-4369-A3F6-8A57DCD46019}" type="datetimeFigureOut">
               <a:rPr lang="en-US" smtClean="0"/>
-              <a:t>2/10/2020</a:t>
+              <a:t>2/11/2020</a:t>
             </a:fld>
             <a:endParaRPr lang="en-US"/>
           </a:p>
@@ -4060,7 +4068,7 @@
           <a:p>
             <a:fld id="{F0B8144F-018C-4369-A3F6-8A57DCD46019}" type="datetimeFigureOut">
               <a:rPr lang="en-US" smtClean="0"/>
-              <a:t>2/10/2020</a:t>
+              <a:t>2/11/2020</a:t>
             </a:fld>
             <a:endParaRPr lang="en-US"/>
           </a:p>
@@ -4542,28 +4550,44 @@
       </p:grpSpPr>
       <p:sp>
         <p:nvSpPr>
-          <p:cNvPr id="3" name="Subtitle 2">
-            <a:extLst>
-              <a:ext uri="{FF2B5EF4-FFF2-40B4-BE49-F238E27FC236}">
-                <a16:creationId xmlns:a16="http://schemas.microsoft.com/office/drawing/2014/main" id="{D1E66A4A-9B5D-424B-8234-6AE3BF30F020}"/>
-              </a:ext>
-            </a:extLst>
-          </p:cNvPr>
-          <p:cNvSpPr>
-            <a:spLocks noGrp="1"/>
-          </p:cNvSpPr>
-          <p:nvPr>
-            <p:ph type="subTitle" idx="1"/>
-          </p:nvPr>
-        </p:nvSpPr>
-        <p:spPr/>
-        <p:txBody>
-          <a:bodyPr/>
+          <p:cNvPr id="2" name="Title 1">
+            <a:extLst>
+              <a:ext uri="{FF2B5EF4-FFF2-40B4-BE49-F238E27FC236}">
+                <a16:creationId xmlns:a16="http://schemas.microsoft.com/office/drawing/2014/main" id="{A88055B4-9FC7-41BF-BFE8-09722E648B26}"/>
+              </a:ext>
+            </a:extLst>
+          </p:cNvPr>
+          <p:cNvSpPr>
+            <a:spLocks noGrp="1"/>
+          </p:cNvSpPr>
+          <p:nvPr>
+            <p:ph type="ctrTitle"/>
+          </p:nvPr>
+        </p:nvSpPr>
+        <p:spPr/>
+        <p:txBody>
+          <a:bodyPr>
+            <a:normAutofit fontScale="90000"/>
+          </a:bodyPr>
           <a:lstStyle/>
           <a:p>
             <a:r>
               <a:rPr lang="en-US" dirty="0"/>
-              <a:t>What is Isolated webpart?</a:t>
+              <a:t>Key takeaways 2</a:t>
+            </a:r>
+            <a:br>
+              <a:rPr lang="en-US" dirty="0"/>
+            </a:br>
+            <a:r>
+              <a:rPr lang="en-US" dirty="0"/>
+              <a:t>- Graph permissions in isolation</a:t>
+            </a:r>
+            <a:br>
+              <a:rPr lang="en-US" dirty="0"/>
+            </a:br>
+            <a:r>
+              <a:rPr lang="en-US" dirty="0"/>
+              <a:t>- alternatives</a:t>
             </a:r>
           </a:p>
         </p:txBody>
@@ -4571,7 +4595,7 @@
     </p:spTree>
     <p:extLst>
       <p:ext uri="{BB962C8B-B14F-4D97-AF65-F5344CB8AC3E}">
-        <p14:creationId xmlns:p14="http://schemas.microsoft.com/office/powerpoint/2010/main" val="1258573394"/>
+        <p14:creationId xmlns:p14="http://schemas.microsoft.com/office/powerpoint/2010/main" val="2736096391"/>
       </p:ext>
     </p:extLst>
   </p:cSld>
@@ -4600,18 +4624,18 @@
       </p:grpSpPr>
       <p:sp>
         <p:nvSpPr>
-          <p:cNvPr id="2" name="Title 1">
-            <a:extLst>
-              <a:ext uri="{FF2B5EF4-FFF2-40B4-BE49-F238E27FC236}">
-                <a16:creationId xmlns:a16="http://schemas.microsoft.com/office/drawing/2014/main" id="{A88055B4-9FC7-41BF-BFE8-09722E648B26}"/>
-              </a:ext>
-            </a:extLst>
-          </p:cNvPr>
-          <p:cNvSpPr>
-            <a:spLocks noGrp="1"/>
-          </p:cNvSpPr>
-          <p:nvPr>
-            <p:ph type="ctrTitle"/>
+          <p:cNvPr id="3" name="Subtitle 2">
+            <a:extLst>
+              <a:ext uri="{FF2B5EF4-FFF2-40B4-BE49-F238E27FC236}">
+                <a16:creationId xmlns:a16="http://schemas.microsoft.com/office/drawing/2014/main" id="{D1E66A4A-9B5D-424B-8234-6AE3BF30F020}"/>
+              </a:ext>
+            </a:extLst>
+          </p:cNvPr>
+          <p:cNvSpPr>
+            <a:spLocks noGrp="1"/>
+          </p:cNvSpPr>
+          <p:nvPr>
+            <p:ph type="subTitle" idx="1"/>
           </p:nvPr>
         </p:nvSpPr>
         <p:spPr/>
@@ -4621,35 +4645,7 @@
           <a:p>
             <a:r>
               <a:rPr lang="en-US" dirty="0"/>
-              <a:t>Grant permissions to the app</a:t>
-            </a:r>
-          </a:p>
-        </p:txBody>
-      </p:sp>
-      <p:sp>
-        <p:nvSpPr>
-          <p:cNvPr id="3" name="Subtitle 2">
-            <a:extLst>
-              <a:ext uri="{FF2B5EF4-FFF2-40B4-BE49-F238E27FC236}">
-                <a16:creationId xmlns:a16="http://schemas.microsoft.com/office/drawing/2014/main" id="{D1E66A4A-9B5D-424B-8234-6AE3BF30F020}"/>
-              </a:ext>
-            </a:extLst>
-          </p:cNvPr>
-          <p:cNvSpPr>
-            <a:spLocks noGrp="1"/>
-          </p:cNvSpPr>
-          <p:nvPr>
-            <p:ph type="subTitle" idx="1"/>
-          </p:nvPr>
-        </p:nvSpPr>
-        <p:spPr/>
-        <p:txBody>
-          <a:bodyPr/>
-          <a:lstStyle/>
-          <a:p>
-            <a:r>
-              <a:rPr lang="en-US" dirty="0"/>
-              <a:t>Using office 365 CLI</a:t>
+              <a:t>What is Isolated webpart?</a:t>
             </a:r>
           </a:p>
         </p:txBody>
@@ -4657,7 +4653,7 @@
     </p:spTree>
     <p:extLst>
       <p:ext uri="{BB962C8B-B14F-4D97-AF65-F5344CB8AC3E}">
-        <p14:creationId xmlns:p14="http://schemas.microsoft.com/office/powerpoint/2010/main" val="1553935718"/>
+        <p14:creationId xmlns:p14="http://schemas.microsoft.com/office/powerpoint/2010/main" val="1258573394"/>
       </p:ext>
     </p:extLst>
   </p:cSld>
@@ -4707,7 +4703,7 @@
           <a:p>
             <a:r>
               <a:rPr lang="en-US" dirty="0"/>
-              <a:t>DEMO 2</a:t>
+              <a:t>Grant permissions to the app</a:t>
             </a:r>
           </a:p>
         </p:txBody>
@@ -4734,12 +4730,8 @@
           <a:lstStyle/>
           <a:p>
             <a:r>
-              <a:rPr lang="en-US" dirty="0" err="1"/>
-              <a:t>HttpGraphClient</a:t>
-            </a:r>
-            <a:r>
               <a:rPr lang="en-US" dirty="0"/>
-              <a:t> in isolated web part in SharePoint</a:t>
+              <a:t>Using office 365 CLI</a:t>
             </a:r>
           </a:p>
         </p:txBody>
@@ -4747,7 +4739,7 @@
     </p:spTree>
     <p:extLst>
       <p:ext uri="{BB962C8B-B14F-4D97-AF65-F5344CB8AC3E}">
-        <p14:creationId xmlns:p14="http://schemas.microsoft.com/office/powerpoint/2010/main" val="1469108768"/>
+        <p14:creationId xmlns:p14="http://schemas.microsoft.com/office/powerpoint/2010/main" val="1553935718"/>
       </p:ext>
     </p:extLst>
   </p:cSld>
@@ -4779,15 +4771,15 @@
           <p:cNvPr id="2" name="Title 1">
             <a:extLst>
               <a:ext uri="{FF2B5EF4-FFF2-40B4-BE49-F238E27FC236}">
-                <a16:creationId xmlns:a16="http://schemas.microsoft.com/office/drawing/2014/main" id="{1906BFC5-DBC7-47E9-A7C0-FF5CAA900026}"/>
-              </a:ext>
-            </a:extLst>
-          </p:cNvPr>
-          <p:cNvSpPr>
-            <a:spLocks noGrp="1"/>
-          </p:cNvSpPr>
-          <p:nvPr>
-            <p:ph type="title"/>
+                <a16:creationId xmlns:a16="http://schemas.microsoft.com/office/drawing/2014/main" id="{A88055B4-9FC7-41BF-BFE8-09722E648B26}"/>
+              </a:ext>
+            </a:extLst>
+          </p:cNvPr>
+          <p:cNvSpPr>
+            <a:spLocks noGrp="1"/>
+          </p:cNvSpPr>
+          <p:nvPr>
+            <p:ph type="ctrTitle"/>
           </p:nvPr>
         </p:nvSpPr>
         <p:spPr/>
@@ -4797,95 +4789,39 @@
           <a:p>
             <a:r>
               <a:rPr lang="en-US" dirty="0"/>
-              <a:t>Alternatives</a:t>
-            </a:r>
-          </a:p>
-        </p:txBody>
-      </p:sp>
-      <p:sp>
-        <p:nvSpPr>
-          <p:cNvPr id="3" name="Content Placeholder 2">
-            <a:extLst>
-              <a:ext uri="{FF2B5EF4-FFF2-40B4-BE49-F238E27FC236}">
-                <a16:creationId xmlns:a16="http://schemas.microsoft.com/office/drawing/2014/main" id="{C604FA2B-25F6-406B-AE4D-B19A15CAF6FD}"/>
-              </a:ext>
-            </a:extLst>
-          </p:cNvPr>
-          <p:cNvSpPr>
-            <a:spLocks noGrp="1"/>
-          </p:cNvSpPr>
-          <p:nvPr>
-            <p:ph idx="1"/>
-          </p:nvPr>
-        </p:nvSpPr>
-        <p:spPr/>
-        <p:txBody>
-          <a:bodyPr>
-            <a:normAutofit lnSpcReduction="10000"/>
-          </a:bodyPr>
+              <a:t>DEMO 2</a:t>
+            </a:r>
+          </a:p>
+        </p:txBody>
+      </p:sp>
+      <p:sp>
+        <p:nvSpPr>
+          <p:cNvPr id="3" name="Subtitle 2">
+            <a:extLst>
+              <a:ext uri="{FF2B5EF4-FFF2-40B4-BE49-F238E27FC236}">
+                <a16:creationId xmlns:a16="http://schemas.microsoft.com/office/drawing/2014/main" id="{D1E66A4A-9B5D-424B-8234-6AE3BF30F020}"/>
+              </a:ext>
+            </a:extLst>
+          </p:cNvPr>
+          <p:cNvSpPr>
+            <a:spLocks noGrp="1"/>
+          </p:cNvSpPr>
+          <p:nvPr>
+            <p:ph type="subTitle" idx="1"/>
+          </p:nvPr>
+        </p:nvSpPr>
+        <p:spPr/>
+        <p:txBody>
+          <a:bodyPr/>
           <a:lstStyle/>
           <a:p>
             <a:r>
               <a:rPr lang="en-US" dirty="0" err="1"/>
-              <a:t>httpsAadClient</a:t>
-            </a:r>
-            <a:endParaRPr lang="en-US" dirty="0"/>
-          </a:p>
-          <a:p>
-            <a:r>
-              <a:rPr lang="en-US" dirty="0">
-                <a:hlinkClick r:id="rId2"/>
-              </a:rPr>
-              <a:t>Graph JavaScript SDK</a:t>
-            </a:r>
-            <a:endParaRPr lang="en-US" dirty="0"/>
-          </a:p>
-          <a:p>
+              <a:t>HttpGraphClient</a:t>
+            </a:r>
             <a:r>
               <a:rPr lang="en-US" dirty="0"/>
-              <a:t>Graph components</a:t>
-            </a:r>
-          </a:p>
-          <a:p>
-            <a:r>
-              <a:rPr lang="en-US" dirty="0" err="1"/>
-              <a:t>Pnpjs</a:t>
-            </a:r>
-            <a:endParaRPr lang="en-US" dirty="0"/>
-          </a:p>
-          <a:p>
-            <a:r>
-              <a:rPr lang="en-US" dirty="0"/>
-              <a:t>Implement it yourself using lib – MSAL, </a:t>
-            </a:r>
-            <a:r>
-              <a:rPr lang="en-US" dirty="0" err="1"/>
-              <a:t>ADALjs</a:t>
-            </a:r>
-            <a:r>
-              <a:rPr lang="en-US" dirty="0"/>
-              <a:t>, </a:t>
-            </a:r>
-          </a:p>
-          <a:p>
-            <a:r>
-              <a:rPr lang="en-US" dirty="0"/>
-              <a:t>Implement it yourself using HTTP calls – old school</a:t>
-            </a:r>
-          </a:p>
-          <a:p>
-            <a:endParaRPr lang="en-US" dirty="0"/>
-          </a:p>
-          <a:p>
-            <a:endParaRPr lang="en-US" dirty="0"/>
-          </a:p>
-          <a:p>
-            <a:pPr marL="0" indent="0">
-              <a:buNone/>
-            </a:pPr>
-            <a:r>
-              <a:rPr lang="en-US" dirty="0"/>
-              <a:t>- Some guidance around that using on-prem </a:t>
+              <a:t> in isolated web part in SharePoint</a:t>
             </a:r>
           </a:p>
         </p:txBody>
@@ -4893,7 +4829,7 @@
     </p:spTree>
     <p:extLst>
       <p:ext uri="{BB962C8B-B14F-4D97-AF65-F5344CB8AC3E}">
-        <p14:creationId xmlns:p14="http://schemas.microsoft.com/office/powerpoint/2010/main" val="138134709"/>
+        <p14:creationId xmlns:p14="http://schemas.microsoft.com/office/powerpoint/2010/main" val="1469108768"/>
       </p:ext>
     </p:extLst>
   </p:cSld>
@@ -4925,7 +4861,7 @@
           <p:cNvPr id="2" name="Title 1">
             <a:extLst>
               <a:ext uri="{FF2B5EF4-FFF2-40B4-BE49-F238E27FC236}">
-                <a16:creationId xmlns:a16="http://schemas.microsoft.com/office/drawing/2014/main" id="{3FFB0CD7-AE7B-4DB9-BA24-B7BC5DC9B002}"/>
+                <a16:creationId xmlns:a16="http://schemas.microsoft.com/office/drawing/2014/main" id="{7A08BE89-9CA8-4471-A150-C72D5B347DAC}"/>
               </a:ext>
             </a:extLst>
           </p:cNvPr>
@@ -4942,8 +4878,20 @@
           <a:lstStyle/>
           <a:p>
             <a:r>
+              <a:rPr lang="en-US" dirty="0" err="1"/>
+              <a:t>msGraphClent</a:t>
+            </a:r>
+            <a:r>
               <a:rPr lang="en-US" dirty="0"/>
-              <a:t>Conclusion</a:t>
+              <a:t> and </a:t>
+            </a:r>
+            <a:r>
+              <a:rPr lang="en-US" dirty="0" err="1"/>
+              <a:t>aadClient</a:t>
+            </a:r>
+            <a:r>
+              <a:rPr lang="en-US" dirty="0"/>
+              <a:t> Caveats</a:t>
             </a:r>
           </a:p>
         </p:txBody>
@@ -4953,7 +4901,7 @@
           <p:cNvPr id="3" name="Content Placeholder 2">
             <a:extLst>
               <a:ext uri="{FF2B5EF4-FFF2-40B4-BE49-F238E27FC236}">
-                <a16:creationId xmlns:a16="http://schemas.microsoft.com/office/drawing/2014/main" id="{FBECA61C-44AC-4EDD-AAB6-2527B383C7B8}"/>
+                <a16:creationId xmlns:a16="http://schemas.microsoft.com/office/drawing/2014/main" id="{93A5F79B-8713-4074-BD92-B5A3E1794336}"/>
               </a:ext>
             </a:extLst>
           </p:cNvPr>
@@ -4970,26 +4918,49 @@
           <a:lstStyle/>
           <a:p>
             <a:r>
-              <a:rPr lang="en-US" dirty="0" err="1"/>
-              <a:t>SPFx</a:t>
-            </a:r>
-            <a:r>
               <a:rPr lang="en-US" dirty="0"/>
-              <a:t>++ as single framework for development across Microsoft 365 services</a:t>
-            </a:r>
-          </a:p>
-          <a:p>
-            <a:r>
-              <a:rPr lang="en-US" dirty="0"/>
-              <a:t>Graph as single endpoint for consuming Microsoft APIs</a:t>
-            </a:r>
+              <a:t>Two graph web parts with different permissions on the page and one access token </a:t>
+            </a:r>
+            <a:r>
+              <a:rPr lang="en-US" dirty="0">
+                <a:sym typeface="Wingdings" panose="05000000000000000000" pitchFamily="2" charset="2"/>
+              </a:rPr>
+              <a:t> (because of ADAL </a:t>
+            </a:r>
+            <a:r>
+              <a:rPr lang="en-US" dirty="0" err="1">
+                <a:sym typeface="Wingdings" panose="05000000000000000000" pitchFamily="2" charset="2"/>
+              </a:rPr>
+              <a:t>js</a:t>
+            </a:r>
+            <a:r>
+              <a:rPr lang="en-US" dirty="0">
+                <a:sym typeface="Wingdings" panose="05000000000000000000" pitchFamily="2" charset="2"/>
+              </a:rPr>
+              <a:t>)</a:t>
+            </a:r>
+          </a:p>
+          <a:p>
+            <a:r>
+              <a:rPr lang="en-US" dirty="0">
+                <a:sym typeface="Wingdings" panose="05000000000000000000" pitchFamily="2" charset="2"/>
+              </a:rPr>
+              <a:t>When debugging using workbench the isolated webpart is not isolated and can conflict and does not retrieve the right </a:t>
+            </a:r>
+            <a:r>
+              <a:rPr lang="en-US">
+                <a:sym typeface="Wingdings" panose="05000000000000000000" pitchFamily="2" charset="2"/>
+              </a:rPr>
+              <a:t>access token.</a:t>
+            </a:r>
+            <a:endParaRPr lang="en-US" dirty="0"/>
           </a:p>
         </p:txBody>
       </p:sp>
     </p:spTree>
     <p:extLst>
       <p:ext uri="{BB962C8B-B14F-4D97-AF65-F5344CB8AC3E}">
-        <p14:creationId xmlns:p14="http://schemas.microsoft.com/office/powerpoint/2010/main" val="2549855593"/>
+        <p14:creationId xmlns:p14="http://schemas.microsoft.com/office/powerpoint/2010/main" val="2794588123"/>
       </p:ext>
     </p:extLst>
   </p:cSld>
@@ -5021,6 +4992,327 @@
           <p:cNvPr id="2" name="Title 1">
             <a:extLst>
               <a:ext uri="{FF2B5EF4-FFF2-40B4-BE49-F238E27FC236}">
+                <a16:creationId xmlns:a16="http://schemas.microsoft.com/office/drawing/2014/main" id="{1906BFC5-DBC7-47E9-A7C0-FF5CAA900026}"/>
+              </a:ext>
+            </a:extLst>
+          </p:cNvPr>
+          <p:cNvSpPr>
+            <a:spLocks noGrp="1"/>
+          </p:cNvSpPr>
+          <p:nvPr>
+            <p:ph type="title"/>
+          </p:nvPr>
+        </p:nvSpPr>
+        <p:spPr/>
+        <p:txBody>
+          <a:bodyPr/>
+          <a:lstStyle/>
+          <a:p>
+            <a:r>
+              <a:rPr lang="en-US" dirty="0"/>
+              <a:t>Alternatives</a:t>
+            </a:r>
+          </a:p>
+        </p:txBody>
+      </p:sp>
+      <p:sp>
+        <p:nvSpPr>
+          <p:cNvPr id="3" name="Content Placeholder 2">
+            <a:extLst>
+              <a:ext uri="{FF2B5EF4-FFF2-40B4-BE49-F238E27FC236}">
+                <a16:creationId xmlns:a16="http://schemas.microsoft.com/office/drawing/2014/main" id="{C604FA2B-25F6-406B-AE4D-B19A15CAF6FD}"/>
+              </a:ext>
+            </a:extLst>
+          </p:cNvPr>
+          <p:cNvSpPr>
+            <a:spLocks noGrp="1"/>
+          </p:cNvSpPr>
+          <p:nvPr>
+            <p:ph idx="1"/>
+          </p:nvPr>
+        </p:nvSpPr>
+        <p:spPr/>
+        <p:txBody>
+          <a:bodyPr>
+            <a:normAutofit lnSpcReduction="10000"/>
+          </a:bodyPr>
+          <a:lstStyle/>
+          <a:p>
+            <a:r>
+              <a:rPr lang="en-US" dirty="0" err="1"/>
+              <a:t>httpsAadClient</a:t>
+            </a:r>
+            <a:endParaRPr lang="en-US" dirty="0"/>
+          </a:p>
+          <a:p>
+            <a:r>
+              <a:rPr lang="en-US" dirty="0">
+                <a:hlinkClick r:id="rId2"/>
+              </a:rPr>
+              <a:t>Graph JavaScript SDK</a:t>
+            </a:r>
+            <a:endParaRPr lang="en-US" dirty="0"/>
+          </a:p>
+          <a:p>
+            <a:r>
+              <a:rPr lang="en-US" dirty="0"/>
+              <a:t>Graph components</a:t>
+            </a:r>
+          </a:p>
+          <a:p>
+            <a:r>
+              <a:rPr lang="en-US" dirty="0" err="1"/>
+              <a:t>Pnpjs</a:t>
+            </a:r>
+            <a:endParaRPr lang="en-US" dirty="0"/>
+          </a:p>
+          <a:p>
+            <a:r>
+              <a:rPr lang="en-US" dirty="0"/>
+              <a:t>Implement it yourself using lib – MSAL, </a:t>
+            </a:r>
+            <a:r>
+              <a:rPr lang="en-US" dirty="0" err="1"/>
+              <a:t>ADALjs</a:t>
+            </a:r>
+            <a:r>
+              <a:rPr lang="en-US" dirty="0"/>
+              <a:t>, </a:t>
+            </a:r>
+          </a:p>
+          <a:p>
+            <a:r>
+              <a:rPr lang="en-US" dirty="0"/>
+              <a:t>Implement it yourself using HTTP calls – old school</a:t>
+            </a:r>
+          </a:p>
+          <a:p>
+            <a:endParaRPr lang="en-US" dirty="0"/>
+          </a:p>
+          <a:p>
+            <a:endParaRPr lang="en-US" dirty="0"/>
+          </a:p>
+          <a:p>
+            <a:pPr marL="0" indent="0">
+              <a:buNone/>
+            </a:pPr>
+            <a:r>
+              <a:rPr lang="en-US" dirty="0"/>
+              <a:t>- Some guidance around that using on-prem </a:t>
+            </a:r>
+          </a:p>
+        </p:txBody>
+      </p:sp>
+    </p:spTree>
+    <p:extLst>
+      <p:ext uri="{BB962C8B-B14F-4D97-AF65-F5344CB8AC3E}">
+        <p14:creationId xmlns:p14="http://schemas.microsoft.com/office/powerpoint/2010/main" val="138134709"/>
+      </p:ext>
+    </p:extLst>
+  </p:cSld>
+  <p:clrMapOvr>
+    <a:masterClrMapping/>
+  </p:clrMapOvr>
+</p:sld>
+</file>
+
+<file path=ppt/slides/slide16.xml><?xml version="1.0" encoding="utf-8"?>
+<p:sld xmlns:a="http://schemas.openxmlformats.org/drawingml/2006/main" xmlns:r="http://schemas.openxmlformats.org/officeDocument/2006/relationships" xmlns:p="http://schemas.openxmlformats.org/presentationml/2006/main">
+  <p:cSld>
+    <p:spTree>
+      <p:nvGrpSpPr>
+        <p:cNvPr id="1" name=""/>
+        <p:cNvGrpSpPr/>
+        <p:nvPr/>
+      </p:nvGrpSpPr>
+      <p:grpSpPr>
+        <a:xfrm>
+          <a:off x="0" y="0"/>
+          <a:ext cx="0" cy="0"/>
+          <a:chOff x="0" y="0"/>
+          <a:chExt cx="0" cy="0"/>
+        </a:xfrm>
+      </p:grpSpPr>
+      <p:sp>
+        <p:nvSpPr>
+          <p:cNvPr id="2" name="Title 1">
+            <a:extLst>
+              <a:ext uri="{FF2B5EF4-FFF2-40B4-BE49-F238E27FC236}">
+                <a16:creationId xmlns:a16="http://schemas.microsoft.com/office/drawing/2014/main" id="{A88055B4-9FC7-41BF-BFE8-09722E648B26}"/>
+              </a:ext>
+            </a:extLst>
+          </p:cNvPr>
+          <p:cNvSpPr>
+            <a:spLocks noGrp="1"/>
+          </p:cNvSpPr>
+          <p:nvPr>
+            <p:ph type="ctrTitle"/>
+          </p:nvPr>
+        </p:nvSpPr>
+        <p:spPr>
+          <a:xfrm>
+            <a:off x="1524000" y="1122362"/>
+            <a:ext cx="9144000" cy="2863711"/>
+          </a:xfrm>
+        </p:spPr>
+        <p:txBody>
+          <a:bodyPr>
+            <a:normAutofit fontScale="90000"/>
+          </a:bodyPr>
+          <a:lstStyle/>
+          <a:p>
+            <a:r>
+              <a:rPr lang="en-US" dirty="0"/>
+              <a:t>Key takeaways 2</a:t>
+            </a:r>
+            <a:br>
+              <a:rPr lang="en-US" dirty="0"/>
+            </a:br>
+            <a:r>
+              <a:rPr lang="en-US" dirty="0"/>
+              <a:t>- Graph permissions in isolation</a:t>
+            </a:r>
+            <a:br>
+              <a:rPr lang="en-US" dirty="0"/>
+            </a:br>
+            <a:r>
+              <a:rPr lang="en-US" dirty="0"/>
+              <a:t>- alternative ways to connect to graph</a:t>
+            </a:r>
+          </a:p>
+        </p:txBody>
+      </p:sp>
+    </p:spTree>
+    <p:extLst>
+      <p:ext uri="{BB962C8B-B14F-4D97-AF65-F5344CB8AC3E}">
+        <p14:creationId xmlns:p14="http://schemas.microsoft.com/office/powerpoint/2010/main" val="2139585878"/>
+      </p:ext>
+    </p:extLst>
+  </p:cSld>
+  <p:clrMapOvr>
+    <a:masterClrMapping/>
+  </p:clrMapOvr>
+</p:sld>
+</file>
+
+<file path=ppt/slides/slide17.xml><?xml version="1.0" encoding="utf-8"?>
+<p:sld xmlns:a="http://schemas.openxmlformats.org/drawingml/2006/main" xmlns:r="http://schemas.openxmlformats.org/officeDocument/2006/relationships" xmlns:p="http://schemas.openxmlformats.org/presentationml/2006/main">
+  <p:cSld>
+    <p:spTree>
+      <p:nvGrpSpPr>
+        <p:cNvPr id="1" name=""/>
+        <p:cNvGrpSpPr/>
+        <p:nvPr/>
+      </p:nvGrpSpPr>
+      <p:grpSpPr>
+        <a:xfrm>
+          <a:off x="0" y="0"/>
+          <a:ext cx="0" cy="0"/>
+          <a:chOff x="0" y="0"/>
+          <a:chExt cx="0" cy="0"/>
+        </a:xfrm>
+      </p:grpSpPr>
+      <p:sp>
+        <p:nvSpPr>
+          <p:cNvPr id="2" name="Title 1">
+            <a:extLst>
+              <a:ext uri="{FF2B5EF4-FFF2-40B4-BE49-F238E27FC236}">
+                <a16:creationId xmlns:a16="http://schemas.microsoft.com/office/drawing/2014/main" id="{3FFB0CD7-AE7B-4DB9-BA24-B7BC5DC9B002}"/>
+              </a:ext>
+            </a:extLst>
+          </p:cNvPr>
+          <p:cNvSpPr>
+            <a:spLocks noGrp="1"/>
+          </p:cNvSpPr>
+          <p:nvPr>
+            <p:ph type="title"/>
+          </p:nvPr>
+        </p:nvSpPr>
+        <p:spPr/>
+        <p:txBody>
+          <a:bodyPr/>
+          <a:lstStyle/>
+          <a:p>
+            <a:r>
+              <a:rPr lang="en-US" dirty="0"/>
+              <a:t>Conclusion</a:t>
+            </a:r>
+          </a:p>
+        </p:txBody>
+      </p:sp>
+      <p:sp>
+        <p:nvSpPr>
+          <p:cNvPr id="3" name="Content Placeholder 2">
+            <a:extLst>
+              <a:ext uri="{FF2B5EF4-FFF2-40B4-BE49-F238E27FC236}">
+                <a16:creationId xmlns:a16="http://schemas.microsoft.com/office/drawing/2014/main" id="{FBECA61C-44AC-4EDD-AAB6-2527B383C7B8}"/>
+              </a:ext>
+            </a:extLst>
+          </p:cNvPr>
+          <p:cNvSpPr>
+            <a:spLocks noGrp="1"/>
+          </p:cNvSpPr>
+          <p:nvPr>
+            <p:ph idx="1"/>
+          </p:nvPr>
+        </p:nvSpPr>
+        <p:spPr/>
+        <p:txBody>
+          <a:bodyPr/>
+          <a:lstStyle/>
+          <a:p>
+            <a:r>
+              <a:rPr lang="en-US" dirty="0" err="1"/>
+              <a:t>SPFx</a:t>
+            </a:r>
+            <a:r>
+              <a:rPr lang="en-US" dirty="0"/>
+              <a:t>++ as single framework for development across Microsoft 365 services</a:t>
+            </a:r>
+          </a:p>
+          <a:p>
+            <a:r>
+              <a:rPr lang="en-US" dirty="0"/>
+              <a:t>Graph as single endpoint for consuming Microsoft APIs</a:t>
+            </a:r>
+          </a:p>
+        </p:txBody>
+      </p:sp>
+    </p:spTree>
+    <p:extLst>
+      <p:ext uri="{BB962C8B-B14F-4D97-AF65-F5344CB8AC3E}">
+        <p14:creationId xmlns:p14="http://schemas.microsoft.com/office/powerpoint/2010/main" val="2549855593"/>
+      </p:ext>
+    </p:extLst>
+  </p:cSld>
+  <p:clrMapOvr>
+    <a:masterClrMapping/>
+  </p:clrMapOvr>
+</p:sld>
+</file>
+
+<file path=ppt/slides/slide18.xml><?xml version="1.0" encoding="utf-8"?>
+<p:sld xmlns:a="http://schemas.openxmlformats.org/drawingml/2006/main" xmlns:r="http://schemas.openxmlformats.org/officeDocument/2006/relationships" xmlns:p="http://schemas.openxmlformats.org/presentationml/2006/main">
+  <p:cSld>
+    <p:spTree>
+      <p:nvGrpSpPr>
+        <p:cNvPr id="1" name=""/>
+        <p:cNvGrpSpPr/>
+        <p:nvPr/>
+      </p:nvGrpSpPr>
+      <p:grpSpPr>
+        <a:xfrm>
+          <a:off x="0" y="0"/>
+          <a:ext cx="0" cy="0"/>
+          <a:chOff x="0" y="0"/>
+          <a:chExt cx="0" cy="0"/>
+        </a:xfrm>
+      </p:grpSpPr>
+      <p:sp>
+        <p:nvSpPr>
+          <p:cNvPr id="2" name="Title 1">
+            <a:extLst>
+              <a:ext uri="{FF2B5EF4-FFF2-40B4-BE49-F238E27FC236}">
                 <a16:creationId xmlns:a16="http://schemas.microsoft.com/office/drawing/2014/main" id="{4234EB0A-0CB0-44FD-9305-C89EA2711F1D}"/>
               </a:ext>
             </a:extLst>
@@ -5102,7 +5394,7 @@
 </p:sld>
 </file>
 
-<file path=ppt/slides/slide16.xml><?xml version="1.0" encoding="utf-8"?>
+<file path=ppt/slides/slide19.xml><?xml version="1.0" encoding="utf-8"?>
 <p:sld xmlns:a="http://schemas.openxmlformats.org/drawingml/2006/main" xmlns:r="http://schemas.openxmlformats.org/officeDocument/2006/relationships" xmlns:p="http://schemas.openxmlformats.org/presentationml/2006/main">
   <p:cSld>
     <p:spTree>
@@ -5640,7 +5932,39 @@
           <a:p>
             <a:r>
               <a:rPr lang="en-US" dirty="0"/>
-              <a:t>Grant permissions from within the web part</a:t>
+              <a:t>DEMO 1</a:t>
+            </a:r>
+          </a:p>
+        </p:txBody>
+      </p:sp>
+      <p:sp>
+        <p:nvSpPr>
+          <p:cNvPr id="3" name="Subtitle 2">
+            <a:extLst>
+              <a:ext uri="{FF2B5EF4-FFF2-40B4-BE49-F238E27FC236}">
+                <a16:creationId xmlns:a16="http://schemas.microsoft.com/office/drawing/2014/main" id="{D1E66A4A-9B5D-424B-8234-6AE3BF30F020}"/>
+              </a:ext>
+            </a:extLst>
+          </p:cNvPr>
+          <p:cNvSpPr>
+            <a:spLocks noGrp="1"/>
+          </p:cNvSpPr>
+          <p:nvPr>
+            <p:ph type="subTitle" idx="1"/>
+          </p:nvPr>
+        </p:nvSpPr>
+        <p:spPr/>
+        <p:txBody>
+          <a:bodyPr/>
+          <a:lstStyle/>
+          <a:p>
+            <a:r>
+              <a:rPr lang="en-US" dirty="0" err="1"/>
+              <a:t>HttpGraphClient</a:t>
+            </a:r>
+            <a:r>
+              <a:rPr lang="en-US" dirty="0"/>
+              <a:t> in Microsoft Teams</a:t>
             </a:r>
           </a:p>
         </p:txBody>
@@ -5648,7 +5972,7 @@
     </p:spTree>
     <p:extLst>
       <p:ext uri="{BB962C8B-B14F-4D97-AF65-F5344CB8AC3E}">
-        <p14:creationId xmlns:p14="http://schemas.microsoft.com/office/powerpoint/2010/main" val="1702450530"/>
+        <p14:creationId xmlns:p14="http://schemas.microsoft.com/office/powerpoint/2010/main" val="3423113989"/>
       </p:ext>
     </p:extLst>
   </p:cSld>
@@ -5693,52 +6017,41 @@
         </p:nvSpPr>
         <p:spPr/>
         <p:txBody>
-          <a:bodyPr/>
+          <a:bodyPr>
+            <a:normAutofit fontScale="90000"/>
+          </a:bodyPr>
           <a:lstStyle/>
           <a:p>
             <a:r>
               <a:rPr lang="en-US" dirty="0"/>
-              <a:t>DEMO 1</a:t>
-            </a:r>
-          </a:p>
-        </p:txBody>
-      </p:sp>
-      <p:sp>
-        <p:nvSpPr>
-          <p:cNvPr id="3" name="Subtitle 2">
-            <a:extLst>
-              <a:ext uri="{FF2B5EF4-FFF2-40B4-BE49-F238E27FC236}">
-                <a16:creationId xmlns:a16="http://schemas.microsoft.com/office/drawing/2014/main" id="{D1E66A4A-9B5D-424B-8234-6AE3BF30F020}"/>
-              </a:ext>
-            </a:extLst>
-          </p:cNvPr>
-          <p:cNvSpPr>
-            <a:spLocks noGrp="1"/>
-          </p:cNvSpPr>
-          <p:nvPr>
-            <p:ph type="subTitle" idx="1"/>
-          </p:nvPr>
-        </p:nvSpPr>
-        <p:spPr/>
-        <p:txBody>
-          <a:bodyPr/>
-          <a:lstStyle/>
-          <a:p>
+              <a:t>Key takeaways</a:t>
+            </a:r>
+            <a:br>
+              <a:rPr lang="en-US" dirty="0"/>
+            </a:br>
+            <a:r>
+              <a:rPr lang="en-US" dirty="0"/>
+              <a:t>- Graph requires permissions</a:t>
+            </a:r>
+            <a:br>
+              <a:rPr lang="en-US" dirty="0"/>
+            </a:br>
+            <a:r>
+              <a:rPr lang="en-US" dirty="0"/>
+              <a:t>- </a:t>
+            </a:r>
             <a:r>
               <a:rPr lang="en-US" dirty="0" err="1"/>
-              <a:t>HttpGraphClient</a:t>
-            </a:r>
-            <a:r>
-              <a:rPr lang="en-US" dirty="0"/>
-              <a:t> in Microsoft Teams</a:t>
-            </a:r>
+              <a:t>httpGraphClient</a:t>
+            </a:r>
+            <a:endParaRPr lang="en-US" dirty="0"/>
           </a:p>
         </p:txBody>
       </p:sp>
     </p:spTree>
     <p:extLst>
       <p:ext uri="{BB962C8B-B14F-4D97-AF65-F5344CB8AC3E}">
-        <p14:creationId xmlns:p14="http://schemas.microsoft.com/office/powerpoint/2010/main" val="3423113989"/>
+        <p14:creationId xmlns:p14="http://schemas.microsoft.com/office/powerpoint/2010/main" val="1702450530"/>
       </p:ext>
     </p:extLst>
   </p:cSld>

</xml_diff>